<commit_message>
Updated the draft document
</commit_message>
<xml_diff>
--- a/DocSources/images/metricslogs-br.pptx
+++ b/DocSources/images/metricslogs-br.pptx
@@ -12662,8 +12662,8 @@
               </p:nvSpPr>
               <p:spPr>
                 <a:xfrm>
-                  <a:off x="2135037" y="5353471"/>
-                  <a:ext cx="1572867" cy="307777"/>
+                  <a:off x="1716780" y="5353471"/>
+                  <a:ext cx="1919116" cy="307777"/>
                 </a:xfrm>
                 <a:prstGeom prst="rect">
                   <a:avLst/>
@@ -12680,7 +12680,13 @@
                     <a:rPr lang="en-US" sz="1400" dirty="0" smtClean="0">
                       <a:latin typeface="Fujitsu Sans" panose="020B0404060202020204" pitchFamily="34" charset="0"/>
                     </a:rPr>
-                    <a:t>Monitors VM for Service A </a:t>
+                    <a:t>Monitors VM for </a:t>
+                  </a:r>
+                  <a:r>
+                    <a:rPr lang="en-US" sz="1400" dirty="0" smtClean="0">
+                      <a:latin typeface="Fujitsu Sans" panose="020B0404060202020204" pitchFamily="34" charset="0"/>
+                    </a:rPr>
+                    <a:t>Service A and B </a:t>
                   </a:r>
                   <a:endParaRPr lang="en-US" sz="1400" dirty="0">
                     <a:latin typeface="Fujitsu Sans" panose="020B0404060202020204" pitchFamily="34" charset="0"/>
@@ -14081,7 +14087,7 @@
               </p:nvSpPr>
               <p:spPr>
                 <a:xfrm>
-                  <a:off x="4716016" y="5571867"/>
+                  <a:off x="4741867" y="5571167"/>
                   <a:ext cx="3430608" cy="233397"/>
                 </a:xfrm>
                 <a:prstGeom prst="rect">
@@ -14208,8 +14214,8 @@
           </p:nvSpPr>
           <p:spPr>
             <a:xfrm>
-              <a:off x="5724128" y="2636912"/>
-              <a:ext cx="1824608" cy="515526"/>
+              <a:off x="5700284" y="2636912"/>
+              <a:ext cx="1848452" cy="515526"/>
             </a:xfrm>
             <a:prstGeom prst="rect">
               <a:avLst/>
@@ -14231,7 +14237,13 @@
                 <a:rPr lang="en-US" sz="1400" dirty="0" smtClean="0">
                   <a:latin typeface="Fujitsu Sans" panose="020B0404060202020204" pitchFamily="34" charset="0"/>
                 </a:rPr>
-                <a:t>Collects and analyzes</a:t>
+                <a:t> Collects </a:t>
+              </a:r>
+              <a:r>
+                <a:rPr lang="en-US" sz="1400" dirty="0" smtClean="0">
+                  <a:latin typeface="Fujitsu Sans" panose="020B0404060202020204" pitchFamily="34" charset="0"/>
+                </a:rPr>
+                <a:t>and analyzes</a:t>
               </a:r>
               <a:endParaRPr lang="en-US" sz="1400" dirty="0">
                 <a:latin typeface="Fujitsu Sans" panose="020B0404060202020204" pitchFamily="34" charset="0"/>
@@ -14247,13 +14259,13 @@
                 <a:rPr lang="en-US" sz="1400" dirty="0" smtClean="0">
                   <a:latin typeface="Fujitsu Sans" panose="020B0404060202020204" pitchFamily="34" charset="0"/>
                 </a:rPr>
-                <a:t>log data on </a:t>
+                <a:t> log </a:t>
               </a:r>
               <a:r>
                 <a:rPr lang="en-US" sz="1400" dirty="0" smtClean="0">
                   <a:latin typeface="Fujitsu Sans" panose="020B0404060202020204" pitchFamily="34" charset="0"/>
                 </a:rPr>
-                <a:t>the</a:t>
+                <a:t>data on the</a:t>
               </a:r>
             </a:p>
             <a:p>
@@ -14266,7 +14278,13 @@
                 <a:rPr lang="de-DE" sz="1400" dirty="0" smtClean="0">
                   <a:latin typeface="Fujitsu Sans" panose="020B0404060202020204" pitchFamily="34" charset="0"/>
                 </a:rPr>
-                <a:t>Monitoring Service</a:t>
+                <a:t> Monitoring </a:t>
+              </a:r>
+              <a:r>
+                <a:rPr lang="de-DE" sz="1400" dirty="0" smtClean="0">
+                  <a:latin typeface="Fujitsu Sans" panose="020B0404060202020204" pitchFamily="34" charset="0"/>
+                </a:rPr>
+                <a:t>Service</a:t>
               </a:r>
               <a:endParaRPr lang="en-US" sz="1400" dirty="0">
                 <a:latin typeface="Fujitsu Sans" panose="020B0404060202020204" pitchFamily="34" charset="0"/>

</xml_diff>